<commit_message>
slides should be good to go
</commit_message>
<xml_diff>
--- a/15-svm/slides.pptx
+++ b/15-svm/slides.pptx
@@ -307,7 +307,7 @@
           <a:p>
             <a:fld id="{DB92F479-4B50-F243-9713-1B12EC2B4BDB}" type="datetimeFigureOut">
               <a:rPr lang="en-US" smtClean="0"/>
-              <a:t>3/28/14</a:t>
+              <a:t>4/20/14</a:t>
             </a:fld>
             <a:endParaRPr lang="en-US"/>
           </a:p>
@@ -4586,8 +4586,133 @@
                 <a:latin typeface="ArialMT"/>
                 <a:sym typeface="Wingdings"/>
               </a:rPr>
-              <a:t>note: C = cost parameter, soft-margin constant</a:t>
-            </a:r>
+              <a:t>note: C = cost parameter, soft-margin </a:t>
+            </a:r>
+            <a:r>
+              <a:rPr lang="en-US" sz="1200" baseline="0" dirty="0" smtClean="0">
+                <a:solidFill>
+                  <a:prstClr val="black"/>
+                </a:solidFill>
+                <a:latin typeface="ArialMT"/>
+                <a:sym typeface="Wingdings"/>
+              </a:rPr>
+              <a:t>constant</a:t>
+            </a:r>
+          </a:p>
+          <a:p>
+            <a:pPr marL="0" marR="0" indent="0" algn="l" defTabSz="457200" rtl="0" eaLnBrk="1" fontAlgn="auto" latinLnBrk="0" hangingPunct="1">
+              <a:lnSpc>
+                <a:spcPct val="100000"/>
+              </a:lnSpc>
+              <a:spcBef>
+                <a:spcPts val="0"/>
+              </a:spcBef>
+              <a:spcAft>
+                <a:spcPts val="0"/>
+              </a:spcAft>
+              <a:buClrTx/>
+              <a:buSzTx/>
+              <a:buFontTx/>
+              <a:buNone/>
+              <a:tabLst/>
+              <a:defRPr/>
+            </a:pPr>
+            <a:r>
+              <a:rPr lang="en-US" sz="1200" baseline="0" dirty="0" smtClean="0">
+                <a:solidFill>
+                  <a:prstClr val="black"/>
+                </a:solidFill>
+                <a:latin typeface="ArialMT"/>
+                <a:sym typeface="Wingdings"/>
+              </a:rPr>
+              <a:t>Greek letter is “</a:t>
+            </a:r>
+            <a:r>
+              <a:rPr lang="en-US" sz="1200" baseline="0" dirty="0" err="1" smtClean="0">
+                <a:solidFill>
+                  <a:prstClr val="black"/>
+                </a:solidFill>
+                <a:latin typeface="ArialMT"/>
+                <a:sym typeface="Wingdings"/>
+              </a:rPr>
+              <a:t>zai</a:t>
+            </a:r>
+            <a:r>
+              <a:rPr lang="en-US" sz="1200" baseline="0" dirty="0" smtClean="0">
+                <a:solidFill>
+                  <a:prstClr val="black"/>
+                </a:solidFill>
+                <a:latin typeface="ArialMT"/>
+                <a:sym typeface="Wingdings"/>
+              </a:rPr>
+              <a:t>” or “</a:t>
+            </a:r>
+            <a:r>
+              <a:rPr lang="en-US" sz="1200" baseline="0" dirty="0" err="1" smtClean="0">
+                <a:solidFill>
+                  <a:prstClr val="black"/>
+                </a:solidFill>
+                <a:latin typeface="ArialMT"/>
+                <a:sym typeface="Wingdings"/>
+              </a:rPr>
+              <a:t>sai</a:t>
+            </a:r>
+            <a:r>
+              <a:rPr lang="en-US" sz="1200" baseline="0" dirty="0" smtClean="0">
+                <a:solidFill>
+                  <a:prstClr val="black"/>
+                </a:solidFill>
+                <a:latin typeface="ArialMT"/>
+                <a:sym typeface="Wingdings"/>
+              </a:rPr>
+              <a:t>” or “</a:t>
+            </a:r>
+            <a:r>
+              <a:rPr lang="en-US" sz="1200" baseline="0" dirty="0" err="1" smtClean="0">
+                <a:solidFill>
+                  <a:prstClr val="black"/>
+                </a:solidFill>
+                <a:latin typeface="ArialMT"/>
+                <a:sym typeface="Wingdings"/>
+              </a:rPr>
+              <a:t>ksai</a:t>
+            </a:r>
+            <a:r>
+              <a:rPr lang="en-US" sz="1200" baseline="0" dirty="0" smtClean="0">
+                <a:solidFill>
+                  <a:prstClr val="black"/>
+                </a:solidFill>
+                <a:latin typeface="ArialMT"/>
+                <a:sym typeface="Wingdings"/>
+              </a:rPr>
+              <a:t>”</a:t>
+            </a:r>
+          </a:p>
+          <a:p>
+            <a:pPr marL="0" marR="0" indent="0" algn="l" defTabSz="457200" rtl="0" eaLnBrk="1" fontAlgn="auto" latinLnBrk="0" hangingPunct="1">
+              <a:lnSpc>
+                <a:spcPct val="100000"/>
+              </a:lnSpc>
+              <a:spcBef>
+                <a:spcPts val="0"/>
+              </a:spcBef>
+              <a:spcAft>
+                <a:spcPts val="0"/>
+              </a:spcAft>
+              <a:buClrTx/>
+              <a:buSzTx/>
+              <a:buFontTx/>
+              <a:buNone/>
+              <a:tabLst/>
+              <a:defRPr/>
+            </a:pPr>
+            <a:endParaRPr lang="en-US" sz="1200" baseline="0" dirty="0" smtClean="0">
+              <a:solidFill>
+                <a:prstClr val="black"/>
+              </a:solidFill>
+              <a:latin typeface="ArialMT"/>
+              <a:sym typeface="Wingdings"/>
+            </a:endParaRPr>
           </a:p>
         </p:txBody>
       </p:sp>
@@ -4948,16 +5073,6 @@
               <a:t>Note: high penalty  fewer misclassified results  narrow margin  more </a:t>
             </a:r>
             <a:r>
-              <a:rPr lang="en-US" sz="1200" baseline="0" dirty="0" err="1" smtClean="0">
-                <a:solidFill>
-                  <a:prstClr val="black"/>
-                </a:solidFill>
-                <a:latin typeface="ArialMT"/>
-                <a:sym typeface="Wingdings"/>
-              </a:rPr>
-              <a:t>genlzn</a:t>
-            </a:r>
-            <a:r>
               <a:rPr lang="en-US" sz="1200" baseline="0" dirty="0" smtClean="0">
                 <a:solidFill>
                   <a:prstClr val="black"/>
@@ -4965,8 +5080,34 @@
                 <a:latin typeface="ArialMT"/>
                 <a:sym typeface="Wingdings"/>
               </a:rPr>
-              <a:t> error</a:t>
-            </a:r>
+              <a:t>generalization error</a:t>
+            </a:r>
+          </a:p>
+          <a:p>
+            <a:pPr marL="0" marR="0" indent="0" algn="l" defTabSz="457200" rtl="0" eaLnBrk="1" fontAlgn="auto" latinLnBrk="0" hangingPunct="1">
+              <a:lnSpc>
+                <a:spcPct val="100000"/>
+              </a:lnSpc>
+              <a:spcBef>
+                <a:spcPts val="0"/>
+              </a:spcBef>
+              <a:spcAft>
+                <a:spcPts val="0"/>
+              </a:spcAft>
+              <a:buClrTx/>
+              <a:buSzTx/>
+              <a:buFontTx/>
+              <a:buNone/>
+              <a:tabLst/>
+              <a:defRPr/>
+            </a:pPr>
+            <a:endParaRPr lang="en-US" sz="1200" baseline="0" dirty="0" smtClean="0">
+              <a:solidFill>
+                <a:prstClr val="black"/>
+              </a:solidFill>
+              <a:latin typeface="ArialMT"/>
+              <a:sym typeface="Wingdings"/>
+            </a:endParaRPr>
           </a:p>
         </p:txBody>
       </p:sp>
@@ -5068,15 +5209,34 @@
               <a:defRPr/>
             </a:pPr>
             <a:r>
-              <a:rPr lang="en-US" sz="1200" baseline="0" smtClean="0">
+              <a:rPr lang="en-US" sz="1200" baseline="0" dirty="0" smtClean="0">
                 <a:solidFill>
                   <a:prstClr val="black"/>
                 </a:solidFill>
                 <a:latin typeface="ArialMT"/>
                 <a:sym typeface="Wingdings"/>
               </a:rPr>
-              <a:t> </a:t>
-            </a:r>
+              <a:t>alphas etc. amount to re-writing the w from earlier</a:t>
+            </a:r>
+          </a:p>
+          <a:p>
+            <a:pPr marL="0" marR="0" indent="0" algn="l" defTabSz="457200" rtl="0" eaLnBrk="1" fontAlgn="auto" latinLnBrk="0" hangingPunct="1">
+              <a:lnSpc>
+                <a:spcPct val="100000"/>
+              </a:lnSpc>
+              <a:spcBef>
+                <a:spcPts val="0"/>
+              </a:spcBef>
+              <a:spcAft>
+                <a:spcPts val="0"/>
+              </a:spcAft>
+              <a:buClrTx/>
+              <a:buSzTx/>
+              <a:buFontTx/>
+              <a:buNone/>
+              <a:tabLst/>
+              <a:defRPr/>
+            </a:pPr>
             <a:endParaRPr lang="en-US" sz="1200" baseline="0" dirty="0" smtClean="0">
               <a:solidFill>
                 <a:prstClr val="black"/>
@@ -5309,8 +5469,44 @@
                 <a:latin typeface="ArialMT"/>
                 <a:sym typeface="Wingdings"/>
               </a:rPr>
-              <a:t>Dot product when vectors are in Euclidean space</a:t>
-            </a:r>
+              <a:t>Dot product when vectors are in Euclidean </a:t>
+            </a:r>
+            <a:r>
+              <a:rPr lang="en-US" sz="1200" baseline="0" dirty="0" smtClean="0">
+                <a:solidFill>
+                  <a:prstClr val="black"/>
+                </a:solidFill>
+                <a:latin typeface="ArialMT"/>
+                <a:sym typeface="Wingdings"/>
+              </a:rPr>
+              <a:t>space</a:t>
+            </a:r>
+          </a:p>
+          <a:p>
+            <a:pPr marL="0" marR="0" indent="0" algn="l" defTabSz="457200" rtl="0" eaLnBrk="1" fontAlgn="auto" latinLnBrk="0" hangingPunct="1">
+              <a:lnSpc>
+                <a:spcPct val="100000"/>
+              </a:lnSpc>
+              <a:spcBef>
+                <a:spcPts val="0"/>
+              </a:spcBef>
+              <a:spcAft>
+                <a:spcPts val="0"/>
+              </a:spcAft>
+              <a:buClrTx/>
+              <a:buSzTx/>
+              <a:buFontTx/>
+              <a:buNone/>
+              <a:tabLst/>
+              <a:defRPr/>
+            </a:pPr>
+            <a:endParaRPr lang="en-US" sz="1200" baseline="0" dirty="0" smtClean="0">
+              <a:solidFill>
+                <a:prstClr val="black"/>
+              </a:solidFill>
+              <a:latin typeface="ArialMT"/>
+              <a:sym typeface="Wingdings"/>
+            </a:endParaRPr>
           </a:p>
         </p:txBody>
       </p:sp>
@@ -15597,11 +15793,7 @@
             </a:br>
             <a:r>
               <a:rPr lang="en-US" sz="5000" dirty="0" smtClean="0"/>
-              <a:t>support </a:t>
-            </a:r>
-            <a:r>
-              <a:rPr lang="en-US" sz="5000" dirty="0" smtClean="0"/>
-              <a:t>vector machines</a:t>
+              <a:t>support vector machines</a:t>
             </a:r>
             <a:endParaRPr lang="en-US" sz="5000" dirty="0"/>
           </a:p>
@@ -17541,7 +17733,21 @@
                 <a:latin typeface="PFDinTextCompPro-Italic"/>
                 <a:cs typeface="PFDinTextCompPro-Italic"/>
               </a:rPr>
-              <a:t>mapping that </a:t>
+              <a:t>mapping </a:t>
+            </a:r>
+            <a:r>
+              <a:rPr lang="en-US" sz="3000" dirty="0" smtClean="0">
+                <a:latin typeface="Symbol" charset="2"/>
+                <a:cs typeface="Symbol" charset="2"/>
+              </a:rPr>
+              <a:t>F</a:t>
+            </a:r>
+            <a:r>
+              <a:rPr lang="en-US" sz="3000" dirty="0" smtClean="0">
+                <a:latin typeface="PFDinTextCompPro-Italic"/>
+                <a:cs typeface="PFDinTextCompPro-Italic"/>
+              </a:rPr>
+              <a:t> that </a:t>
             </a:r>
             <a:r>
               <a:rPr lang="en-US" sz="3000" dirty="0">
@@ -20349,8 +20555,8 @@
         </p:nvSpPr>
         <p:spPr>
           <a:xfrm>
-            <a:off x="566737" y="1104900"/>
-            <a:ext cx="8382000" cy="2400657"/>
+            <a:off x="566737" y="1714500"/>
+            <a:ext cx="8382000" cy="1938992"/>
           </a:xfrm>
           <a:prstGeom prst="rect">
             <a:avLst/>
@@ -20383,8 +20589,33 @@
                 <a:latin typeface="PFDinTextCompPro-Italic"/>
                 <a:cs typeface="PFDinTextCompPro-Italic"/>
               </a:rPr>
-              <a:t> is a straightforward exercise in analytic geometry (we won’t go through the details here).</a:t>
-            </a:r>
+              <a:t> is </a:t>
+            </a:r>
+            <a:r>
+              <a:rPr lang="en-US" sz="3000" dirty="0" smtClean="0">
+                <a:latin typeface="PFDinTextCompPro-Italic"/>
+                <a:cs typeface="PFDinTextCompPro-Italic"/>
+              </a:rPr>
+              <a:t>an exercise </a:t>
+            </a:r>
+            <a:r>
+              <a:rPr lang="en-US" sz="3000" dirty="0" smtClean="0">
+                <a:latin typeface="PFDinTextCompPro-Italic"/>
+                <a:cs typeface="PFDinTextCompPro-Italic"/>
+              </a:rPr>
+              <a:t>in analytic </a:t>
+            </a:r>
+            <a:r>
+              <a:rPr lang="en-US" sz="3000" dirty="0" smtClean="0">
+                <a:latin typeface="PFDinTextCompPro-Italic"/>
+                <a:cs typeface="PFDinTextCompPro-Italic"/>
+              </a:rPr>
+              <a:t>geometry.</a:t>
+            </a:r>
+            <a:endParaRPr lang="en-US" sz="3000" dirty="0" smtClean="0">
+              <a:latin typeface="PFDinTextCompPro-Italic"/>
+              <a:cs typeface="PFDinTextCompPro-Italic"/>
+            </a:endParaRPr>
           </a:p>
           <a:p>
             <a:pPr algn="l"/>
@@ -23201,7 +23432,31 @@
                   <a:cs typeface="PFDinTextCompPro-Italic"/>
                   <a:sym typeface="News706 BT" charset="0"/>
                 </a:rPr>
-                <a:t>This type of optimization problem is called a </a:t>
+                <a:t>This type of optimization problem </a:t>
+              </a:r>
+              <a:r>
+                <a:rPr lang="en-US" sz="900" dirty="0" smtClean="0">
+                  <a:solidFill>
+                    <a:schemeClr val="tx1"/>
+                  </a:solidFill>
+                  <a:latin typeface="+mn-lt"/>
+                  <a:ea typeface="ＭＳ Ｐゴシック" charset="0"/>
+                  <a:cs typeface="PFDinTextCompPro-Italic"/>
+                  <a:sym typeface="News706 BT" charset="0"/>
+                </a:rPr>
+                <a:t>can be solved with</a:t>
+              </a:r>
+              <a:r>
+                <a:rPr lang="en-US" sz="900" dirty="0" smtClean="0">
+                  <a:solidFill>
+                    <a:schemeClr val="tx1"/>
+                  </a:solidFill>
+                  <a:latin typeface="+mn-lt"/>
+                  <a:ea typeface="ＭＳ Ｐゴシック" charset="0"/>
+                  <a:cs typeface="PFDinTextCompPro-Italic"/>
+                  <a:sym typeface="News706 BT" charset="0"/>
+                </a:rPr>
+                <a:t> </a:t>
               </a:r>
               <a:r>
                 <a:rPr lang="en-US" sz="900" i="1" dirty="0" smtClean="0">
@@ -23213,7 +23468,19 @@
                   <a:cs typeface="PFDinTextCompPro-Italic"/>
                   <a:sym typeface="News706 BT" charset="0"/>
                 </a:rPr>
-                <a:t>quadratic program</a:t>
+                <a:t>quadratic </a:t>
+              </a:r>
+              <a:r>
+                <a:rPr lang="en-US" sz="900" i="1" dirty="0" smtClean="0">
+                  <a:solidFill>
+                    <a:schemeClr val="tx1"/>
+                  </a:solidFill>
+                  <a:latin typeface="+mn-lt"/>
+                  <a:ea typeface="ＭＳ Ｐゴシック" charset="0"/>
+                  <a:cs typeface="PFDinTextCompPro-Italic"/>
+                  <a:sym typeface="News706 BT" charset="0"/>
+                </a:rPr>
+                <a:t>programming</a:t>
               </a:r>
               <a:r>
                 <a:rPr lang="en-US" sz="900" dirty="0" smtClean="0">
@@ -23227,6 +23494,15 @@
                 </a:rPr>
                 <a:t>.</a:t>
               </a:r>
+              <a:endParaRPr lang="en-US" sz="900" dirty="0" smtClean="0">
+                <a:solidFill>
+                  <a:schemeClr val="tx1"/>
+                </a:solidFill>
+                <a:latin typeface="+mn-lt"/>
+                <a:ea typeface="ＭＳ Ｐゴシック" charset="0"/>
+                <a:cs typeface="PFDinTextCompPro-Italic"/>
+                <a:sym typeface="News706 BT" charset="0"/>
+              </a:endParaRPr>
             </a:p>
             <a:p>
               <a:pPr algn="l">
@@ -24679,6 +24955,157 @@
           </a:p>
         </p:txBody>
       </p:sp>
+      <p:sp>
+        <p:nvSpPr>
+          <p:cNvPr id="9" name="TextBox 8"/>
+          <p:cNvSpPr txBox="1"/>
+          <p:nvPr/>
+        </p:nvSpPr>
+        <p:spPr>
+          <a:xfrm>
+            <a:off x="566737" y="1104900"/>
+            <a:ext cx="8382000" cy="3785652"/>
+          </a:xfrm>
+          <a:prstGeom prst="rect">
+            <a:avLst/>
+          </a:prstGeom>
+          <a:noFill/>
+        </p:spPr>
+        <p:txBody>
+          <a:bodyPr wrap="square" rtlCol="0">
+            <a:spAutoFit/>
+          </a:bodyPr>
+          <a:lstStyle/>
+          <a:p>
+            <a:pPr algn="l"/>
+            <a:r>
+              <a:rPr lang="en-US" sz="3000" dirty="0" smtClean="0">
+                <a:latin typeface="PFDinTextCompPro-Italic"/>
+                <a:cs typeface="PFDinTextCompPro-Italic"/>
+              </a:rPr>
+              <a:t>Slack variables </a:t>
+            </a:r>
+            <a:r>
+              <a:rPr lang="en-US" sz="3000" i="1" dirty="0" smtClean="0">
+                <a:latin typeface="Symbol" charset="2"/>
+                <a:cs typeface="Symbol" charset="2"/>
+              </a:rPr>
+              <a:t>x</a:t>
+            </a:r>
+            <a:r>
+              <a:rPr lang="en-US" sz="2500" i="1" baseline="-25000" dirty="0" smtClean="0">
+                <a:latin typeface="+mn-lt"/>
+                <a:cs typeface="Symbol" charset="2"/>
+              </a:rPr>
+              <a:t>i</a:t>
+            </a:r>
+            <a:r>
+              <a:rPr lang="en-US" sz="3000" dirty="0" smtClean="0">
+                <a:latin typeface="Symbol" charset="2"/>
+                <a:cs typeface="Symbol" charset="2"/>
+              </a:rPr>
+              <a:t> </a:t>
+            </a:r>
+            <a:r>
+              <a:rPr lang="en-US" sz="3000" dirty="0" smtClean="0">
+                <a:latin typeface="PFDinTextCompPro-Italic"/>
+                <a:cs typeface="PFDinTextCompPro-Italic"/>
+              </a:rPr>
+              <a:t>generalize the optimization problem to permit some misclassified training records (which come at a cost </a:t>
+            </a:r>
+            <a:r>
+              <a:rPr lang="en-US" sz="2500" i="1" dirty="0" smtClean="0">
+                <a:latin typeface="+mn-lt"/>
+                <a:cs typeface="PFDinTextCompPro-Italic"/>
+              </a:rPr>
+              <a:t>C</a:t>
+            </a:r>
+            <a:r>
+              <a:rPr lang="en-US" sz="3000" dirty="0" smtClean="0">
+                <a:latin typeface="PFDinTextCompPro-Italic"/>
+                <a:cs typeface="PFDinTextCompPro-Italic"/>
+              </a:rPr>
+              <a:t>).</a:t>
+            </a:r>
+          </a:p>
+          <a:p>
+            <a:pPr algn="l"/>
+            <a:endParaRPr lang="en-US" sz="3000" dirty="0">
+              <a:latin typeface="PFDinTextCompPro-Italic"/>
+              <a:cs typeface="PFDinTextCompPro-Italic"/>
+            </a:endParaRPr>
+          </a:p>
+          <a:p>
+            <a:pPr algn="l"/>
+            <a:r>
+              <a:rPr lang="en-US" sz="3000" dirty="0" smtClean="0">
+                <a:latin typeface="PFDinTextCompPro-Italic"/>
+                <a:cs typeface="PFDinTextCompPro-Italic"/>
+              </a:rPr>
+              <a:t>The resulting </a:t>
+            </a:r>
+            <a:r>
+              <a:rPr lang="en-US" sz="3000" dirty="0" smtClean="0">
+                <a:latin typeface="PFDinTextCompPro-Medium"/>
+                <a:cs typeface="PFDinTextCompPro-Medium"/>
+              </a:rPr>
+              <a:t>soft margin classifier </a:t>
+            </a:r>
+            <a:r>
+              <a:rPr lang="en-US" sz="3000" dirty="0" smtClean="0">
+                <a:latin typeface="PFDinTextCompPro-Italic"/>
+                <a:cs typeface="PFDinTextCompPro-Italic"/>
+              </a:rPr>
+              <a:t>is given by:</a:t>
+            </a:r>
+          </a:p>
+          <a:p>
+            <a:pPr algn="l"/>
+            <a:endParaRPr lang="en-US" sz="3000" dirty="0">
+              <a:latin typeface="PFDinTextCompPro-Italic"/>
+              <a:cs typeface="PFDinTextCompPro-Italic"/>
+            </a:endParaRPr>
+          </a:p>
+          <a:p>
+            <a:pPr algn="l"/>
+            <a:endParaRPr lang="en-US" sz="3000" dirty="0" smtClean="0">
+              <a:latin typeface="PFDinTextCompPro-Italic"/>
+              <a:cs typeface="PFDinTextCompPro-Italic"/>
+            </a:endParaRPr>
+          </a:p>
+          <a:p>
+            <a:pPr algn="l"/>
+            <a:endParaRPr lang="en-US" sz="3000" dirty="0">
+              <a:latin typeface="PFDinTextCompPro-Italic"/>
+              <a:cs typeface="PFDinTextCompPro-Italic"/>
+            </a:endParaRPr>
+          </a:p>
+          <a:p>
+            <a:pPr algn="l"/>
+            <a:r>
+              <a:rPr lang="en-US" sz="3000" dirty="0" smtClean="0">
+                <a:latin typeface="PFDinTextCompPro-Italic"/>
+                <a:cs typeface="PFDinTextCompPro-Italic"/>
+              </a:rPr>
+              <a:t>This an example of </a:t>
+            </a:r>
+            <a:r>
+              <a:rPr lang="en-US" sz="3000" i="1" dirty="0" smtClean="0">
+                <a:latin typeface="PFDinTextCompPro-Italic"/>
+                <a:cs typeface="PFDinTextCompPro-Italic"/>
+              </a:rPr>
+              <a:t>bias-variance tradeoff</a:t>
+            </a:r>
+            <a:r>
+              <a:rPr lang="en-US" sz="3000" dirty="0" smtClean="0">
+                <a:latin typeface="PFDinTextCompPro-Italic"/>
+                <a:cs typeface="PFDinTextCompPro-Italic"/>
+              </a:rPr>
+              <a:t>.</a:t>
+            </a:r>
+          </a:p>
+        </p:txBody>
+      </p:sp>
       <p:pic>
         <p:nvPicPr>
           <p:cNvPr id="2" name="Picture 1"/>
@@ -24703,157 +25130,6 @@
           </a:prstGeom>
         </p:spPr>
       </p:pic>
-      <p:sp>
-        <p:nvSpPr>
-          <p:cNvPr id="9" name="TextBox 8"/>
-          <p:cNvSpPr txBox="1"/>
-          <p:nvPr/>
-        </p:nvSpPr>
-        <p:spPr>
-          <a:xfrm>
-            <a:off x="566737" y="1104900"/>
-            <a:ext cx="8382000" cy="3785652"/>
-          </a:xfrm>
-          <a:prstGeom prst="rect">
-            <a:avLst/>
-          </a:prstGeom>
-          <a:noFill/>
-        </p:spPr>
-        <p:txBody>
-          <a:bodyPr wrap="square" rtlCol="0">
-            <a:spAutoFit/>
-          </a:bodyPr>
-          <a:lstStyle/>
-          <a:p>
-            <a:pPr algn="l"/>
-            <a:r>
-              <a:rPr lang="en-US" sz="3000" dirty="0" smtClean="0">
-                <a:latin typeface="PFDinTextCompPro-Italic"/>
-                <a:cs typeface="PFDinTextCompPro-Italic"/>
-              </a:rPr>
-              <a:t>Slack variables </a:t>
-            </a:r>
-            <a:r>
-              <a:rPr lang="en-US" sz="3000" i="1" dirty="0" smtClean="0">
-                <a:latin typeface="Symbol" charset="2"/>
-                <a:cs typeface="Symbol" charset="2"/>
-              </a:rPr>
-              <a:t>x</a:t>
-            </a:r>
-            <a:r>
-              <a:rPr lang="en-US" sz="2500" i="1" baseline="-25000" dirty="0" smtClean="0">
-                <a:latin typeface="+mn-lt"/>
-                <a:cs typeface="Symbol" charset="2"/>
-              </a:rPr>
-              <a:t>i</a:t>
-            </a:r>
-            <a:r>
-              <a:rPr lang="en-US" sz="3000" dirty="0" smtClean="0">
-                <a:latin typeface="Symbol" charset="2"/>
-                <a:cs typeface="Symbol" charset="2"/>
-              </a:rPr>
-              <a:t> </a:t>
-            </a:r>
-            <a:r>
-              <a:rPr lang="en-US" sz="3000" dirty="0" smtClean="0">
-                <a:latin typeface="PFDinTextCompPro-Italic"/>
-                <a:cs typeface="PFDinTextCompPro-Italic"/>
-              </a:rPr>
-              <a:t>generalize the optimization problem to permit some misclassified training records (which come at a cost </a:t>
-            </a:r>
-            <a:r>
-              <a:rPr lang="en-US" sz="2500" i="1" dirty="0" smtClean="0">
-                <a:latin typeface="+mn-lt"/>
-                <a:cs typeface="PFDinTextCompPro-Italic"/>
-              </a:rPr>
-              <a:t>C</a:t>
-            </a:r>
-            <a:r>
-              <a:rPr lang="en-US" sz="3000" dirty="0" smtClean="0">
-                <a:latin typeface="PFDinTextCompPro-Italic"/>
-                <a:cs typeface="PFDinTextCompPro-Italic"/>
-              </a:rPr>
-              <a:t>).</a:t>
-            </a:r>
-          </a:p>
-          <a:p>
-            <a:pPr algn="l"/>
-            <a:endParaRPr lang="en-US" sz="3000" dirty="0">
-              <a:latin typeface="PFDinTextCompPro-Italic"/>
-              <a:cs typeface="PFDinTextCompPro-Italic"/>
-            </a:endParaRPr>
-          </a:p>
-          <a:p>
-            <a:pPr algn="l"/>
-            <a:r>
-              <a:rPr lang="en-US" sz="3000" dirty="0" smtClean="0">
-                <a:latin typeface="PFDinTextCompPro-Italic"/>
-                <a:cs typeface="PFDinTextCompPro-Italic"/>
-              </a:rPr>
-              <a:t>The resulting </a:t>
-            </a:r>
-            <a:r>
-              <a:rPr lang="en-US" sz="3000" dirty="0" smtClean="0">
-                <a:latin typeface="PFDinTextCompPro-Medium"/>
-                <a:cs typeface="PFDinTextCompPro-Medium"/>
-              </a:rPr>
-              <a:t>soft margin classifier </a:t>
-            </a:r>
-            <a:r>
-              <a:rPr lang="en-US" sz="3000" dirty="0" smtClean="0">
-                <a:latin typeface="PFDinTextCompPro-Italic"/>
-                <a:cs typeface="PFDinTextCompPro-Italic"/>
-              </a:rPr>
-              <a:t>is given by:</a:t>
-            </a:r>
-          </a:p>
-          <a:p>
-            <a:pPr algn="l"/>
-            <a:endParaRPr lang="en-US" sz="3000" dirty="0">
-              <a:latin typeface="PFDinTextCompPro-Italic"/>
-              <a:cs typeface="PFDinTextCompPro-Italic"/>
-            </a:endParaRPr>
-          </a:p>
-          <a:p>
-            <a:pPr algn="l"/>
-            <a:endParaRPr lang="en-US" sz="3000" dirty="0" smtClean="0">
-              <a:latin typeface="PFDinTextCompPro-Italic"/>
-              <a:cs typeface="PFDinTextCompPro-Italic"/>
-            </a:endParaRPr>
-          </a:p>
-          <a:p>
-            <a:pPr algn="l"/>
-            <a:endParaRPr lang="en-US" sz="3000" dirty="0">
-              <a:latin typeface="PFDinTextCompPro-Italic"/>
-              <a:cs typeface="PFDinTextCompPro-Italic"/>
-            </a:endParaRPr>
-          </a:p>
-          <a:p>
-            <a:pPr algn="l"/>
-            <a:r>
-              <a:rPr lang="en-US" sz="3000" dirty="0" smtClean="0">
-                <a:latin typeface="PFDinTextCompPro-Italic"/>
-                <a:cs typeface="PFDinTextCompPro-Italic"/>
-              </a:rPr>
-              <a:t>This an example of </a:t>
-            </a:r>
-            <a:r>
-              <a:rPr lang="en-US" sz="3000" i="1" dirty="0" smtClean="0">
-                <a:latin typeface="PFDinTextCompPro-Italic"/>
-                <a:cs typeface="PFDinTextCompPro-Italic"/>
-              </a:rPr>
-              <a:t>bias-variance tradeoff</a:t>
-            </a:r>
-            <a:r>
-              <a:rPr lang="en-US" sz="3000" dirty="0" smtClean="0">
-                <a:latin typeface="PFDinTextCompPro-Italic"/>
-                <a:cs typeface="PFDinTextCompPro-Italic"/>
-              </a:rPr>
-              <a:t>.</a:t>
-            </a:r>
-          </a:p>
-        </p:txBody>
-      </p:sp>
     </p:spTree>
     <p:extLst>
       <p:ext uri="{BB962C8B-B14F-4D97-AF65-F5344CB8AC3E}">

</xml_diff>

<commit_message>
typo 'varable' to 'variable'
</commit_message>
<xml_diff>
--- a/15-svm/slides.pptx
+++ b/15-svm/slides.pptx
@@ -307,7 +307,7 @@
           <a:p>
             <a:fld id="{DB92F479-4B50-F243-9713-1B12EC2B4BDB}" type="datetimeFigureOut">
               <a:rPr lang="en-US" smtClean="0"/>
-              <a:t>4/20/14</a:t>
+              <a:t>4/23/14</a:t>
             </a:fld>
             <a:endParaRPr lang="en-US"/>
           </a:p>
@@ -4586,17 +4586,7 @@
                 <a:latin typeface="ArialMT"/>
                 <a:sym typeface="Wingdings"/>
               </a:rPr>
-              <a:t>note: C = cost parameter, soft-margin </a:t>
-            </a:r>
-            <a:r>
-              <a:rPr lang="en-US" sz="1200" baseline="0" dirty="0" smtClean="0">
-                <a:solidFill>
-                  <a:prstClr val="black"/>
-                </a:solidFill>
-                <a:latin typeface="ArialMT"/>
-                <a:sym typeface="Wingdings"/>
-              </a:rPr>
-              <a:t>constant</a:t>
+              <a:t>note: C = cost parameter, soft-margin constant</a:t>
             </a:r>
           </a:p>
           <a:p>
@@ -5070,17 +5060,7 @@
                 <a:latin typeface="ArialMT"/>
                 <a:sym typeface="Wingdings"/>
               </a:rPr>
-              <a:t>Note: high penalty  fewer misclassified results  narrow margin  more </a:t>
-            </a:r>
-            <a:r>
-              <a:rPr lang="en-US" sz="1200" baseline="0" dirty="0" smtClean="0">
-                <a:solidFill>
-                  <a:prstClr val="black"/>
-                </a:solidFill>
-                <a:latin typeface="ArialMT"/>
-                <a:sym typeface="Wingdings"/>
-              </a:rPr>
-              <a:t>generalization error</a:t>
+              <a:t>Note: high penalty  fewer misclassified results  narrow margin  more generalization error</a:t>
             </a:r>
           </a:p>
           <a:p>
@@ -5469,17 +5449,7 @@
                 <a:latin typeface="ArialMT"/>
                 <a:sym typeface="Wingdings"/>
               </a:rPr>
-              <a:t>Dot product when vectors are in Euclidean </a:t>
-            </a:r>
-            <a:r>
-              <a:rPr lang="en-US" sz="1200" baseline="0" dirty="0" smtClean="0">
-                <a:solidFill>
-                  <a:prstClr val="black"/>
-                </a:solidFill>
-                <a:latin typeface="ArialMT"/>
-                <a:sym typeface="Wingdings"/>
-              </a:rPr>
-              <a:t>space</a:t>
+              <a:t>Dot product when vectors are in Euclidean space</a:t>
             </a:r>
           </a:p>
           <a:p>
@@ -20589,33 +20559,8 @@
                 <a:latin typeface="PFDinTextCompPro-Italic"/>
                 <a:cs typeface="PFDinTextCompPro-Italic"/>
               </a:rPr>
-              <a:t> is </a:t>
-            </a:r>
-            <a:r>
-              <a:rPr lang="en-US" sz="3000" dirty="0" smtClean="0">
-                <a:latin typeface="PFDinTextCompPro-Italic"/>
-                <a:cs typeface="PFDinTextCompPro-Italic"/>
-              </a:rPr>
-              <a:t>an exercise </a:t>
-            </a:r>
-            <a:r>
-              <a:rPr lang="en-US" sz="3000" dirty="0" smtClean="0">
-                <a:latin typeface="PFDinTextCompPro-Italic"/>
-                <a:cs typeface="PFDinTextCompPro-Italic"/>
-              </a:rPr>
-              <a:t>in analytic </a:t>
-            </a:r>
-            <a:r>
-              <a:rPr lang="en-US" sz="3000" dirty="0" smtClean="0">
-                <a:latin typeface="PFDinTextCompPro-Italic"/>
-                <a:cs typeface="PFDinTextCompPro-Italic"/>
-              </a:rPr>
-              <a:t>geometry.</a:t>
-            </a:r>
-            <a:endParaRPr lang="en-US" sz="3000" dirty="0" smtClean="0">
-              <a:latin typeface="PFDinTextCompPro-Italic"/>
-              <a:cs typeface="PFDinTextCompPro-Italic"/>
-            </a:endParaRPr>
+              <a:t> is an exercise in analytic geometry.</a:t>
+            </a:r>
           </a:p>
           <a:p>
             <a:pPr algn="l"/>
@@ -23432,31 +23377,7 @@
                   <a:cs typeface="PFDinTextCompPro-Italic"/>
                   <a:sym typeface="News706 BT" charset="0"/>
                 </a:rPr>
-                <a:t>This type of optimization problem </a:t>
-              </a:r>
-              <a:r>
-                <a:rPr lang="en-US" sz="900" dirty="0" smtClean="0">
-                  <a:solidFill>
-                    <a:schemeClr val="tx1"/>
-                  </a:solidFill>
-                  <a:latin typeface="+mn-lt"/>
-                  <a:ea typeface="ＭＳ Ｐゴシック" charset="0"/>
-                  <a:cs typeface="PFDinTextCompPro-Italic"/>
-                  <a:sym typeface="News706 BT" charset="0"/>
-                </a:rPr>
-                <a:t>can be solved with</a:t>
-              </a:r>
-              <a:r>
-                <a:rPr lang="en-US" sz="900" dirty="0" smtClean="0">
-                  <a:solidFill>
-                    <a:schemeClr val="tx1"/>
-                  </a:solidFill>
-                  <a:latin typeface="+mn-lt"/>
-                  <a:ea typeface="ＭＳ Ｐゴシック" charset="0"/>
-                  <a:cs typeface="PFDinTextCompPro-Italic"/>
-                  <a:sym typeface="News706 BT" charset="0"/>
-                </a:rPr>
-                <a:t> </a:t>
+                <a:t>This type of optimization problem can be solved with </a:t>
               </a:r>
               <a:r>
                 <a:rPr lang="en-US" sz="900" i="1" dirty="0" smtClean="0">
@@ -23468,19 +23389,7 @@
                   <a:cs typeface="PFDinTextCompPro-Italic"/>
                   <a:sym typeface="News706 BT" charset="0"/>
                 </a:rPr>
-                <a:t>quadratic </a:t>
-              </a:r>
-              <a:r>
-                <a:rPr lang="en-US" sz="900" i="1" dirty="0" smtClean="0">
-                  <a:solidFill>
-                    <a:schemeClr val="tx1"/>
-                  </a:solidFill>
-                  <a:latin typeface="+mn-lt"/>
-                  <a:ea typeface="ＭＳ Ｐゴシック" charset="0"/>
-                  <a:cs typeface="PFDinTextCompPro-Italic"/>
-                  <a:sym typeface="News706 BT" charset="0"/>
-                </a:rPr>
-                <a:t>programming</a:t>
+                <a:t>quadratic programming</a:t>
               </a:r>
               <a:r>
                 <a:rPr lang="en-US" sz="900" dirty="0" smtClean="0">
@@ -23494,15 +23403,6 @@
                 </a:rPr>
                 <a:t>.</a:t>
               </a:r>
-              <a:endParaRPr lang="en-US" sz="900" dirty="0" smtClean="0">
-                <a:solidFill>
-                  <a:schemeClr val="tx1"/>
-                </a:solidFill>
-                <a:latin typeface="+mn-lt"/>
-                <a:ea typeface="ＭＳ Ｐゴシック" charset="0"/>
-                <a:cs typeface="PFDinTextCompPro-Italic"/>
-                <a:sym typeface="News706 BT" charset="0"/>
-              </a:endParaRPr>
             </a:p>
             <a:p>
               <a:pPr algn="l">
@@ -23676,7 +23576,7 @@
             </a:r>
             <a:r>
               <a:rPr lang="en-US" sz="7500" dirty="0" err="1" smtClean="0"/>
-              <a:t>varables</a:t>
+              <a:t>varIables</a:t>
             </a:r>
             <a:endParaRPr lang="en-US" sz="7500" dirty="0"/>
           </a:p>

</xml_diff>